<commit_message>
TW edits for title and diagram
</commit_message>
<xml_diff>
--- a/docs/deployment_guide/images/dotnetcore-fargate-cicd-architecture-diagram.pptx
+++ b/docs/deployment_guide/images/dotnetcore-fargate-cicd-architecture-diagram.pptx
@@ -223,7 +223,7 @@
           <a:p>
             <a:fld id="{49A7721D-1176-A640-AC48-B82F78C92D56}" type="datetimeFigureOut">
               <a:rPr lang="en-US" smtClean="0"/>
-              <a:t>1/19/2022</a:t>
+              <a:t>2/24/2023</a:t>
             </a:fld>
             <a:endParaRPr lang="en-US" dirty="0"/>
           </a:p>
@@ -400,7 +400,7 @@
           <a:p>
             <a:fld id="{C884A089-FB25-6D46-9D21-F0F04A18BCA8}" type="datetimeFigureOut">
               <a:rPr lang="en-US" smtClean="0"/>
-              <a:t>1/19/2022</a:t>
+              <a:t>2/24/2023</a:t>
             </a:fld>
             <a:endParaRPr lang="en-US" dirty="0"/>
           </a:p>
@@ -3324,112 +3324,6 @@
           </a:prstGeom>
         </p:spPr>
       </p:pic>
-      <p:sp>
-        <p:nvSpPr>
-          <p:cNvPr id="103" name="Rectangle 102">
-            <a:extLst>
-              <a:ext uri="{FF2B5EF4-FFF2-40B4-BE49-F238E27FC236}">
-                <a16:creationId xmlns:a16="http://schemas.microsoft.com/office/drawing/2014/main" id="{4771CEC0-992A-40E7-BC8B-62AA676574A4}"/>
-              </a:ext>
-            </a:extLst>
-          </p:cNvPr>
-          <p:cNvSpPr/>
-          <p:nvPr/>
-        </p:nvSpPr>
-        <p:spPr>
-          <a:xfrm>
-            <a:off x="3840480" y="1371600"/>
-            <a:ext cx="6675120" cy="3749040"/>
-          </a:xfrm>
-          <a:prstGeom prst="rect">
-            <a:avLst/>
-          </a:prstGeom>
-          <a:noFill/>
-          <a:ln w="12700">
-            <a:solidFill>
-              <a:srgbClr val="1E8900"/>
-            </a:solidFill>
-          </a:ln>
-        </p:spPr>
-        <p:style>
-          <a:lnRef idx="2">
-            <a:schemeClr val="accent1">
-              <a:shade val="50000"/>
-            </a:schemeClr>
-          </a:lnRef>
-          <a:fillRef idx="1">
-            <a:schemeClr val="accent1"/>
-          </a:fillRef>
-          <a:effectRef idx="0">
-            <a:schemeClr val="accent1"/>
-          </a:effectRef>
-          <a:fontRef idx="minor">
-            <a:schemeClr val="lt1"/>
-          </a:fontRef>
-        </p:style>
-        <p:txBody>
-          <a:bodyPr lIns="502920" tIns="91440"/>
-          <a:lstStyle/>
-          <a:p>
-            <a:pPr eaLnBrk="1" fontAlgn="auto" hangingPunct="1">
-              <a:spcBef>
-                <a:spcPts val="0"/>
-              </a:spcBef>
-              <a:spcAft>
-                <a:spcPts val="0"/>
-              </a:spcAft>
-              <a:defRPr/>
-            </a:pPr>
-            <a:r>
-              <a:rPr lang="en-US" sz="1200" dirty="0">
-                <a:ln w="0"/>
-                <a:solidFill>
-                  <a:srgbClr val="1E8900"/>
-                </a:solidFill>
-                <a:latin typeface="Arial" panose="020B0604020202020204" pitchFamily="34" charset="0"/>
-                <a:cs typeface="Arial" panose="020B0604020202020204" pitchFamily="34" charset="0"/>
-              </a:rPr>
-              <a:t>VPC</a:t>
-            </a:r>
-          </a:p>
-        </p:txBody>
-      </p:sp>
-      <p:pic>
-        <p:nvPicPr>
-          <p:cNvPr id="104" name="Graphic 103">
-            <a:extLst>
-              <a:ext uri="{FF2B5EF4-FFF2-40B4-BE49-F238E27FC236}">
-                <a16:creationId xmlns:a16="http://schemas.microsoft.com/office/drawing/2014/main" id="{63FAD68A-2A9A-4BA2-A379-8E99B49EF40E}"/>
-              </a:ext>
-            </a:extLst>
-          </p:cNvPr>
-          <p:cNvPicPr>
-            <a:picLocks noChangeAspect="1"/>
-          </p:cNvPicPr>
-          <p:nvPr/>
-        </p:nvPicPr>
-        <p:blipFill>
-          <a:blip r:embed="rId15">
-            <a:extLst>
-              <a:ext uri="{96DAC541-7B7A-43D3-8B79-37D633B846F1}">
-                <asvg:svgBlip xmlns:asvg="http://schemas.microsoft.com/office/drawing/2016/SVG/main" r:embed="rId16"/>
-              </a:ext>
-            </a:extLst>
-          </a:blip>
-          <a:stretch>
-            <a:fillRect/>
-          </a:stretch>
-        </p:blipFill>
-        <p:spPr>
-          <a:xfrm>
-            <a:off x="3840480" y="1371600"/>
-            <a:ext cx="381000" cy="381000"/>
-          </a:xfrm>
-          <a:prstGeom prst="rect">
-            <a:avLst/>
-          </a:prstGeom>
-        </p:spPr>
-      </p:pic>
       <p:cxnSp>
         <p:nvCxnSpPr>
           <p:cNvPr id="105" name="Straight Arrow Connector 104">
@@ -3846,10 +3740,10 @@
           <p:nvPr/>
         </p:nvPicPr>
         <p:blipFill>
-          <a:blip r:embed="rId17">
+          <a:blip r:embed="rId15">
             <a:extLst>
               <a:ext uri="{96DAC541-7B7A-43D3-8B79-37D633B846F1}">
-                <asvg:svgBlip xmlns:asvg="http://schemas.microsoft.com/office/drawing/2016/SVG/main" r:embed="rId18"/>
+                <asvg:svgBlip xmlns:asvg="http://schemas.microsoft.com/office/drawing/2016/SVG/main" r:embed="rId16"/>
               </a:ext>
             </a:extLst>
           </a:blip>
@@ -3882,7 +3776,7 @@
           <p:nvPr/>
         </p:nvPicPr>
         <p:blipFill>
-          <a:blip r:embed="rId19">
+          <a:blip r:embed="rId17">
             <a:extLst>
               <a:ext uri="{28A0092B-C50C-407E-A947-70E740481C1C}">
                 <a14:useLocalDpi xmlns:a14="http://schemas.microsoft.com/office/drawing/2010/main" val="0"/>
@@ -3942,7 +3836,7 @@
           <p:nvPr/>
         </p:nvPicPr>
         <p:blipFill>
-          <a:blip r:embed="rId20">
+          <a:blip r:embed="rId18">
             <a:extLst>
               <a:ext uri="{28A0092B-C50C-407E-A947-70E740481C1C}">
                 <a14:useLocalDpi xmlns:a14="http://schemas.microsoft.com/office/drawing/2010/main" val="0"/>
@@ -4145,6 +4039,119 @@
               </a:rPr>
               <a:t>IAM</a:t>
             </a:r>
+          </a:p>
+        </p:txBody>
+      </p:sp>
+      <p:pic>
+        <p:nvPicPr>
+          <p:cNvPr id="44" name="Graphic 43">
+            <a:extLst>
+              <a:ext uri="{FF2B5EF4-FFF2-40B4-BE49-F238E27FC236}">
+                <a16:creationId xmlns:a16="http://schemas.microsoft.com/office/drawing/2014/main" id="{2845B8C0-8E2A-46B8-BBE9-D1EFEAD7CC07}"/>
+              </a:ext>
+            </a:extLst>
+          </p:cNvPr>
+          <p:cNvPicPr>
+            <a:picLocks noChangeAspect="1"/>
+          </p:cNvPicPr>
+          <p:nvPr/>
+        </p:nvPicPr>
+        <p:blipFill>
+          <a:blip r:embed="rId19">
+            <a:extLst>
+              <a:ext uri="{96DAC541-7B7A-43D3-8B79-37D633B846F1}">
+                <asvg:svgBlip xmlns:asvg="http://schemas.microsoft.com/office/drawing/2016/SVG/main" r:embed="rId20"/>
+              </a:ext>
+            </a:extLst>
+          </a:blip>
+          <a:srcRect/>
+          <a:stretch/>
+        </p:blipFill>
+        <p:spPr>
+          <a:xfrm>
+            <a:off x="3840480" y="1371600"/>
+            <a:ext cx="381000" cy="381000"/>
+          </a:xfrm>
+          <a:prstGeom prst="rect">
+            <a:avLst/>
+          </a:prstGeom>
+        </p:spPr>
+      </p:pic>
+      <p:sp>
+        <p:nvSpPr>
+          <p:cNvPr id="45" name="Rectangle 44">
+            <a:extLst>
+              <a:ext uri="{FF2B5EF4-FFF2-40B4-BE49-F238E27FC236}">
+                <a16:creationId xmlns:a16="http://schemas.microsoft.com/office/drawing/2014/main" id="{B1B41FD1-0BC7-4083-A981-7D6AB1909803}"/>
+              </a:ext>
+            </a:extLst>
+          </p:cNvPr>
+          <p:cNvSpPr/>
+          <p:nvPr/>
+        </p:nvSpPr>
+        <p:spPr bwMode="auto">
+          <a:xfrm>
+            <a:off x="3840480" y="1371600"/>
+            <a:ext cx="6675120" cy="3749040"/>
+          </a:xfrm>
+          <a:prstGeom prst="rect">
+            <a:avLst/>
+          </a:prstGeom>
+          <a:noFill/>
+          <a:ln w="12700">
+            <a:solidFill>
+              <a:srgbClr val="693BC5"/>
+            </a:solidFill>
+          </a:ln>
+        </p:spPr>
+        <p:style>
+          <a:lnRef idx="2">
+            <a:schemeClr val="accent1">
+              <a:shade val="50000"/>
+            </a:schemeClr>
+          </a:lnRef>
+          <a:fillRef idx="1">
+            <a:schemeClr val="accent1"/>
+          </a:fillRef>
+          <a:effectRef idx="0">
+            <a:schemeClr val="accent1"/>
+          </a:effectRef>
+          <a:fontRef idx="minor">
+            <a:schemeClr val="lt1"/>
+          </a:fontRef>
+        </p:style>
+        <p:txBody>
+          <a:bodyPr lIns="502920" tIns="91440"/>
+          <a:lstStyle/>
+          <a:p>
+            <a:pPr eaLnBrk="1" fontAlgn="auto" hangingPunct="1">
+              <a:spcBef>
+                <a:spcPts val="0"/>
+              </a:spcBef>
+              <a:spcAft>
+                <a:spcPts val="0"/>
+              </a:spcAft>
+              <a:defRPr/>
+            </a:pPr>
+            <a:r>
+              <a:rPr lang="en-US" sz="1200">
+                <a:ln w="0"/>
+                <a:solidFill>
+                  <a:srgbClr val="693BC5"/>
+                </a:solidFill>
+                <a:latin typeface="Arial" panose="020B0604020202020204" pitchFamily="34" charset="0"/>
+                <a:cs typeface="Arial" panose="020B0604020202020204" pitchFamily="34" charset="0"/>
+              </a:rPr>
+              <a:t>VPC</a:t>
+            </a:r>
+            <a:endParaRPr lang="en-US" sz="1200" dirty="0">
+              <a:ln w="0"/>
+              <a:solidFill>
+                <a:srgbClr val="693BC5"/>
+              </a:solidFill>
+              <a:latin typeface="Arial" panose="020B0604020202020204" pitchFamily="34" charset="0"/>
+              <a:cs typeface="Arial" panose="020B0604020202020204" pitchFamily="34" charset="0"/>
+            </a:endParaRPr>
           </a:p>
         </p:txBody>
       </p:sp>

</xml_diff>